<commit_message>
Move data to index.js
</commit_message>
<xml_diff>
--- a/src/img/Структура_Проекта.pptx
+++ b/src/img/Структура_Проекта.pptx
@@ -7631,8 +7631,8 @@
         </p:nvSpPr>
         <p:spPr>
           <a:xfrm>
-            <a:off x="3346325" y="2447125"/>
-            <a:ext cx="638100" cy="248100"/>
+            <a:off x="3169025" y="2447125"/>
+            <a:ext cx="815400" cy="248100"/>
           </a:xfrm>
           <a:prstGeom prst="rect">
             <a:avLst/>
@@ -7669,7 +7669,7 @@
                   <a:srgbClr val="CCCCCC"/>
                 </a:solidFill>
               </a:rPr>
-              <a:t>Dialogs</a:t>
+              <a:t>DialogsList</a:t>
             </a:r>
             <a:endParaRPr sz="1000">
               <a:solidFill>
@@ -7743,7 +7743,7 @@
         </p:nvSpPr>
         <p:spPr>
           <a:xfrm>
-            <a:off x="3233825" y="3285475"/>
+            <a:off x="3169025" y="3285475"/>
             <a:ext cx="815400" cy="248100"/>
           </a:xfrm>
           <a:prstGeom prst="rect">
@@ -7801,9 +7801,9 @@
           <p:nvPr/>
         </p:nvCxnSpPr>
         <p:spPr>
-          <a:xfrm flipH="1">
-            <a:off x="3641675" y="2695225"/>
-            <a:ext cx="23700" cy="590400"/>
+          <a:xfrm>
+            <a:off x="3576725" y="2695225"/>
+            <a:ext cx="0" cy="590400"/>
           </a:xfrm>
           <a:prstGeom prst="straightConnector1">
             <a:avLst/>
@@ -7828,7 +7828,7 @@
         </p:nvSpPr>
         <p:spPr>
           <a:xfrm>
-            <a:off x="4227575" y="3285475"/>
+            <a:off x="4161425" y="3285475"/>
             <a:ext cx="947700" cy="248100"/>
           </a:xfrm>
           <a:prstGeom prst="rect">
@@ -7896,7 +7896,7 @@
         <p:spPr>
           <a:xfrm>
             <a:off x="4635275" y="2695225"/>
-            <a:ext cx="66300" cy="590400"/>
+            <a:ext cx="0" cy="590400"/>
           </a:xfrm>
           <a:prstGeom prst="straightConnector1">
             <a:avLst/>
@@ -7924,8 +7924,8 @@
         </p:nvCxnSpPr>
         <p:spPr>
           <a:xfrm flipH="1">
-            <a:off x="3665525" y="2133425"/>
-            <a:ext cx="449100" cy="313800"/>
+            <a:off x="3576725" y="2133425"/>
+            <a:ext cx="537900" cy="313800"/>
           </a:xfrm>
           <a:prstGeom prst="straightConnector1">
             <a:avLst/>

</xml_diff>